<commit_message>
make kubernetes default profile
</commit_message>
<xml_diff>
--- a/sample/kubernetes/Bring your own device - Teil 2.pptx
+++ b/sample/kubernetes/Bring your own device - Teil 2.pptx
@@ -208,7 +208,7 @@
           <a:p>
             <a:fld id="{5CCD219F-F703-C14B-A05B-DA5DAB0DC4D2}" type="datetimeFigureOut">
               <a:rPr lang="de-DE" smtClean="0"/>
-              <a:t>19.03.23</a:t>
+              <a:t>24.03.25</a:t>
             </a:fld>
             <a:endParaRPr lang="de-DE"/>
           </a:p>
@@ -790,7 +790,7 @@
           <a:p>
             <a:fld id="{6B40B35D-B481-DF4E-B1B0-2B6288A3F72B}" type="datetimeFigureOut">
               <a:rPr lang="de-DE" smtClean="0"/>
-              <a:t>19.03.23</a:t>
+              <a:t>24.03.25</a:t>
             </a:fld>
             <a:endParaRPr lang="de-DE"/>
           </a:p>
@@ -988,7 +988,7 @@
           <a:p>
             <a:fld id="{6B40B35D-B481-DF4E-B1B0-2B6288A3F72B}" type="datetimeFigureOut">
               <a:rPr lang="de-DE" smtClean="0"/>
-              <a:t>19.03.23</a:t>
+              <a:t>24.03.25</a:t>
             </a:fld>
             <a:endParaRPr lang="de-DE"/>
           </a:p>
@@ -1196,7 +1196,7 @@
           <a:p>
             <a:fld id="{6B40B35D-B481-DF4E-B1B0-2B6288A3F72B}" type="datetimeFigureOut">
               <a:rPr lang="de-DE" smtClean="0"/>
-              <a:t>19.03.23</a:t>
+              <a:t>24.03.25</a:t>
             </a:fld>
             <a:endParaRPr lang="de-DE"/>
           </a:p>
@@ -1394,7 +1394,7 @@
           <a:p>
             <a:fld id="{6B40B35D-B481-DF4E-B1B0-2B6288A3F72B}" type="datetimeFigureOut">
               <a:rPr lang="de-DE" smtClean="0"/>
-              <a:t>19.03.23</a:t>
+              <a:t>24.03.25</a:t>
             </a:fld>
             <a:endParaRPr lang="de-DE"/>
           </a:p>
@@ -1669,7 +1669,7 @@
           <a:p>
             <a:fld id="{6B40B35D-B481-DF4E-B1B0-2B6288A3F72B}" type="datetimeFigureOut">
               <a:rPr lang="de-DE" smtClean="0"/>
-              <a:t>19.03.23</a:t>
+              <a:t>24.03.25</a:t>
             </a:fld>
             <a:endParaRPr lang="de-DE"/>
           </a:p>
@@ -1934,7 +1934,7 @@
           <a:p>
             <a:fld id="{6B40B35D-B481-DF4E-B1B0-2B6288A3F72B}" type="datetimeFigureOut">
               <a:rPr lang="de-DE" smtClean="0"/>
-              <a:t>19.03.23</a:t>
+              <a:t>24.03.25</a:t>
             </a:fld>
             <a:endParaRPr lang="de-DE"/>
           </a:p>
@@ -2346,7 +2346,7 @@
           <a:p>
             <a:fld id="{6B40B35D-B481-DF4E-B1B0-2B6288A3F72B}" type="datetimeFigureOut">
               <a:rPr lang="de-DE" smtClean="0"/>
-              <a:t>19.03.23</a:t>
+              <a:t>24.03.25</a:t>
             </a:fld>
             <a:endParaRPr lang="de-DE"/>
           </a:p>
@@ -2487,7 +2487,7 @@
           <a:p>
             <a:fld id="{6B40B35D-B481-DF4E-B1B0-2B6288A3F72B}" type="datetimeFigureOut">
               <a:rPr lang="de-DE" smtClean="0"/>
-              <a:t>19.03.23</a:t>
+              <a:t>24.03.25</a:t>
             </a:fld>
             <a:endParaRPr lang="de-DE"/>
           </a:p>
@@ -2600,7 +2600,7 @@
           <a:p>
             <a:fld id="{6B40B35D-B481-DF4E-B1B0-2B6288A3F72B}" type="datetimeFigureOut">
               <a:rPr lang="de-DE" smtClean="0"/>
-              <a:t>19.03.23</a:t>
+              <a:t>24.03.25</a:t>
             </a:fld>
             <a:endParaRPr lang="de-DE"/>
           </a:p>
@@ -2911,7 +2911,7 @@
           <a:p>
             <a:fld id="{6B40B35D-B481-DF4E-B1B0-2B6288A3F72B}" type="datetimeFigureOut">
               <a:rPr lang="de-DE" smtClean="0"/>
-              <a:t>19.03.23</a:t>
+              <a:t>24.03.25</a:t>
             </a:fld>
             <a:endParaRPr lang="de-DE"/>
           </a:p>
@@ -3199,7 +3199,7 @@
           <a:p>
             <a:fld id="{6B40B35D-B481-DF4E-B1B0-2B6288A3F72B}" type="datetimeFigureOut">
               <a:rPr lang="de-DE" smtClean="0"/>
-              <a:t>19.03.23</a:t>
+              <a:t>24.03.25</a:t>
             </a:fld>
             <a:endParaRPr lang="de-DE"/>
           </a:p>
@@ -3440,7 +3440,7 @@
           <a:p>
             <a:fld id="{6B40B35D-B481-DF4E-B1B0-2B6288A3F72B}" type="datetimeFigureOut">
               <a:rPr lang="de-DE" smtClean="0"/>
-              <a:t>19.03.23</a:t>
+              <a:t>24.03.25</a:t>
             </a:fld>
             <a:endParaRPr lang="de-DE"/>
           </a:p>
@@ -6267,6 +6267,20 @@
               </a:rPr>
               <a:t>install</a:t>
             </a:r>
+            <a:r>
+              <a:rPr lang="de-DE" sz="2400" dirty="0">
+                <a:latin typeface="Courier New" panose="02070309020205020404" pitchFamily="49" charset="0"/>
+                <a:cs typeface="Courier New" panose="02070309020205020404" pitchFamily="49" charset="0"/>
+              </a:rPr>
+              <a:t> -</a:t>
+            </a:r>
+            <a:r>
+              <a:rPr lang="de-DE" sz="2400" dirty="0" err="1">
+                <a:latin typeface="Courier New" panose="02070309020205020404" pitchFamily="49" charset="0"/>
+                <a:cs typeface="Courier New" panose="02070309020205020404" pitchFamily="49" charset="0"/>
+              </a:rPr>
+              <a:t>Pkubernetes</a:t>
+            </a:r>
             <a:endParaRPr lang="de-DE" sz="2400" dirty="0">
               <a:latin typeface="Courier New" panose="02070309020205020404" pitchFamily="49" charset="0"/>
               <a:cs typeface="Courier New" panose="02070309020205020404" pitchFamily="49" charset="0"/>
@@ -6345,6 +6359,20 @@
               </a:rPr>
               <a:t>install</a:t>
             </a:r>
+            <a:r>
+              <a:rPr lang="de-DE" sz="2400" dirty="0">
+                <a:latin typeface="Courier New" panose="02070309020205020404" pitchFamily="49" charset="0"/>
+                <a:cs typeface="Courier New" panose="02070309020205020404" pitchFamily="49" charset="0"/>
+              </a:rPr>
+              <a:t> -</a:t>
+            </a:r>
+            <a:r>
+              <a:rPr lang="de-DE" sz="2400" dirty="0" err="1">
+                <a:latin typeface="Courier New" panose="02070309020205020404" pitchFamily="49" charset="0"/>
+                <a:cs typeface="Courier New" panose="02070309020205020404" pitchFamily="49" charset="0"/>
+              </a:rPr>
+              <a:t>Pkubernetes</a:t>
+            </a:r>
             <a:endParaRPr lang="de-DE" sz="2400" dirty="0">
               <a:latin typeface="Courier New" panose="02070309020205020404" pitchFamily="49" charset="0"/>
               <a:cs typeface="Courier New" panose="02070309020205020404" pitchFamily="49" charset="0"/>
@@ -6422,6 +6450,20 @@
                 <a:cs typeface="Courier New" panose="02070309020205020404" pitchFamily="49" charset="0"/>
               </a:rPr>
               <a:t>install</a:t>
+            </a:r>
+            <a:r>
+              <a:rPr lang="de-DE" sz="2400" dirty="0">
+                <a:latin typeface="Courier New" panose="02070309020205020404" pitchFamily="49" charset="0"/>
+                <a:cs typeface="Courier New" panose="02070309020205020404" pitchFamily="49" charset="0"/>
+              </a:rPr>
+              <a:t> -</a:t>
+            </a:r>
+            <a:r>
+              <a:rPr lang="de-DE" sz="2400">
+                <a:latin typeface="Courier New" panose="02070309020205020404" pitchFamily="49" charset="0"/>
+                <a:cs typeface="Courier New" panose="02070309020205020404" pitchFamily="49" charset="0"/>
+              </a:rPr>
+              <a:t>Pkubernetes</a:t>
             </a:r>
             <a:endParaRPr lang="de-DE" sz="2400" dirty="0">
               <a:latin typeface="Courier New" panose="02070309020205020404" pitchFamily="49" charset="0"/>

</xml_diff>